<commit_message>
updating and adding for CODODN.
</commit_message>
<xml_diff>
--- a/2013/KCDC/WPFIntro.pptx
+++ b/2013/KCDC/WPFIntro.pptx
@@ -7432,6 +7432,13 @@
   <p:clrMapOvr>
     <a:masterClrMapping/>
   </p:clrMapOvr>
+  <p:timing>
+    <p:tnLst>
+      <p:par>
+        <p:cTn id="1" dur="indefinite" restart="never" nodeType="tmRoot"/>
+      </p:par>
+    </p:tnLst>
+  </p:timing>
 </p:sld>
 </file>
 
@@ -18621,6 +18628,13 @@
   <p:clrMapOvr>
     <a:masterClrMapping/>
   </p:clrMapOvr>
+  <p:timing>
+    <p:tnLst>
+      <p:par>
+        <p:cTn id="1" dur="indefinite" restart="never" nodeType="tmRoot"/>
+      </p:par>
+    </p:tnLst>
+  </p:timing>
 </p:sld>
 </file>
 
@@ -18910,7 +18924,15 @@
             </a:r>
             <a:r>
               <a:rPr lang="en-US" dirty="0" smtClean="0"/>
-              <a:t> and Jesse Liberty are doing </a:t>
+              <a:t> and </a:t>
+            </a:r>
+            <a:r>
+              <a:rPr lang="en-US" dirty="0" smtClean="0"/>
+              <a:t>Clint Edmonson </a:t>
+            </a:r>
+            <a:r>
+              <a:rPr lang="en-US" dirty="0" smtClean="0"/>
+              <a:t>are doing </a:t>
             </a:r>
             <a:r>
               <a:rPr lang="en-US" dirty="0"/>

</xml_diff>